<commit_message>
case6 is kind of working
</commit_message>
<xml_diff>
--- a/rc_network.pptx
+++ b/rc_network.pptx
@@ -20449,8 +20449,8 @@
           </p:sp>
         </mc:Fallback>
       </mc:AlternateContent>
-      <mc:AlternateContent xmlns:mc="http://schemas.openxmlformats.org/markup-compatibility/2006">
-        <mc:Choice xmlns:a14="http://schemas.microsoft.com/office/drawing/2010/main" Requires="a14">
+      <mc:AlternateContent xmlns:mc="http://schemas.openxmlformats.org/markup-compatibility/2006" xmlns:a14="http://schemas.microsoft.com/office/drawing/2010/main">
+        <mc:Choice Requires="a14">
           <p:sp>
             <p:nvSpPr>
               <p:cNvPr id="38" name="TextBox 37">
@@ -20541,7 +20541,7 @@
             </p:txBody>
           </p:sp>
         </mc:Choice>
-        <mc:Fallback>
+        <mc:Fallback xmlns="">
           <p:sp>
             <p:nvSpPr>
               <p:cNvPr id="38" name="TextBox 37">

</xml_diff>